<commit_message>
add more level to priority
</commit_message>
<xml_diff>
--- a/PMSClient/Resource/Files/pmshelp_ch.pptx
+++ b/PMSClient/Resource/Files/pmshelp_ch.pptx
@@ -2,7 +2,7 @@
 <file path=ppt/presentation.xml><?xml version="1.0" encoding="utf-8"?>
 <p:presentation xmlns:a="http://schemas.openxmlformats.org/drawingml/2006/main" xmlns:r="http://schemas.openxmlformats.org/officeDocument/2006/relationships" xmlns:p="http://schemas.openxmlformats.org/presentationml/2006/main" saveSubsetFonts="1">
   <p:sldMasterIdLst>
-    <p:sldMasterId id="2147483648" r:id="rId1"/>
+    <p:sldMasterId id="2147483768" r:id="rId1"/>
   </p:sldMasterIdLst>
   <p:sldIdLst>
     <p:sldId id="256" r:id="rId2"/>
@@ -12,11 +12,12 @@
     <p:sldId id="261" r:id="rId6"/>
     <p:sldId id="263" r:id="rId7"/>
     <p:sldId id="260" r:id="rId8"/>
-    <p:sldId id="266" r:id="rId9"/>
-    <p:sldId id="264" r:id="rId10"/>
-    <p:sldId id="265" r:id="rId11"/>
-    <p:sldId id="267" r:id="rId12"/>
-    <p:sldId id="262" r:id="rId13"/>
+    <p:sldId id="267" r:id="rId9"/>
+    <p:sldId id="265" r:id="rId10"/>
+    <p:sldId id="264" r:id="rId11"/>
+    <p:sldId id="266" r:id="rId12"/>
+    <p:sldId id="268" r:id="rId13"/>
+    <p:sldId id="262" r:id="rId14"/>
   </p:sldIdLst>
   <p:sldSz cx="9144000" cy="6858000" type="screen4x3"/>
   <p:notesSz cx="6858000" cy="9144000"/>
@@ -117,7 +118,7 @@
   </p:defaultTextStyle>
   <p:extLst>
     <p:ext uri="{EFAFB233-063F-42B5-8137-9DF3F51BA10A}">
-      <p15:sldGuideLst xmlns="" xmlns:p15="http://schemas.microsoft.com/office/powerpoint/2012/main">
+      <p15:sldGuideLst xmlns:p15="http://schemas.microsoft.com/office/powerpoint/2012/main" xmlns="">
         <p15:guide id="1" orient="horz" pos="2160">
           <p15:clr>
             <a:srgbClr val="A4A3A4"/>
@@ -172,9 +173,10 @@
           <a:lstStyle/>
           <a:p>
             <a:r>
-              <a:rPr lang="zh-CN" altLang="en-US"/>
+              <a:rPr lang="zh-CN" altLang="en-US" smtClean="0"/>
               <a:t>单击此处编辑母版标题样式</a:t>
             </a:r>
+            <a:endParaRPr lang="zh-CN" altLang="en-US"/>
           </a:p>
         </p:txBody>
       </p:sp>
@@ -290,9 +292,10 @@
           </a:lstStyle>
           <a:p>
             <a:r>
-              <a:rPr lang="zh-CN" altLang="en-US"/>
+              <a:rPr lang="zh-CN" altLang="en-US" smtClean="0"/>
               <a:t>单击此处编辑母版副标题样式</a:t>
             </a:r>
+            <a:endParaRPr lang="zh-CN" altLang="en-US"/>
           </a:p>
         </p:txBody>
       </p:sp>
@@ -314,7 +317,7 @@
             <a:fld id="{C26AAE33-BF1E-4903-BB73-0456FE4D27DA}" type="datetimeFigureOut">
               <a:rPr lang="zh-CN" altLang="en-US" smtClean="0"/>
               <a:pPr/>
-              <a:t>2017/4/23</a:t>
+              <a:t>2017/5/18</a:t>
             </a:fld>
             <a:endParaRPr lang="zh-CN" altLang="en-US"/>
           </a:p>
@@ -404,9 +407,10 @@
           <a:lstStyle/>
           <a:p>
             <a:r>
-              <a:rPr lang="zh-CN" altLang="en-US"/>
+              <a:rPr lang="zh-CN" altLang="en-US" smtClean="0"/>
               <a:t>单击此处编辑母版标题样式</a:t>
             </a:r>
+            <a:endParaRPr lang="zh-CN" altLang="en-US"/>
           </a:p>
         </p:txBody>
       </p:sp>
@@ -427,37 +431,38 @@
           <a:p>
             <a:pPr lvl="0"/>
             <a:r>
-              <a:rPr lang="zh-CN" altLang="en-US"/>
+              <a:rPr lang="zh-CN" altLang="en-US" smtClean="0"/>
               <a:t>单击此处编辑母版文本样式</a:t>
             </a:r>
           </a:p>
           <a:p>
             <a:pPr lvl="1"/>
             <a:r>
-              <a:rPr lang="zh-CN" altLang="en-US"/>
+              <a:rPr lang="zh-CN" altLang="en-US" smtClean="0"/>
               <a:t>第二级</a:t>
             </a:r>
           </a:p>
           <a:p>
             <a:pPr lvl="2"/>
             <a:r>
-              <a:rPr lang="zh-CN" altLang="en-US"/>
+              <a:rPr lang="zh-CN" altLang="en-US" smtClean="0"/>
               <a:t>第三级</a:t>
             </a:r>
           </a:p>
           <a:p>
             <a:pPr lvl="3"/>
             <a:r>
-              <a:rPr lang="zh-CN" altLang="en-US"/>
+              <a:rPr lang="zh-CN" altLang="en-US" smtClean="0"/>
               <a:t>第四级</a:t>
             </a:r>
           </a:p>
           <a:p>
             <a:pPr lvl="4"/>
             <a:r>
-              <a:rPr lang="zh-CN" altLang="en-US"/>
+              <a:rPr lang="zh-CN" altLang="en-US" smtClean="0"/>
               <a:t>第五级</a:t>
             </a:r>
+            <a:endParaRPr lang="zh-CN" altLang="en-US"/>
           </a:p>
         </p:txBody>
       </p:sp>
@@ -479,7 +484,7 @@
             <a:fld id="{C26AAE33-BF1E-4903-BB73-0456FE4D27DA}" type="datetimeFigureOut">
               <a:rPr lang="zh-CN" altLang="en-US" smtClean="0"/>
               <a:pPr/>
-              <a:t>2017/4/23</a:t>
+              <a:t>2017/5/18</a:t>
             </a:fld>
             <a:endParaRPr lang="zh-CN" altLang="en-US"/>
           </a:p>
@@ -574,9 +579,10 @@
           <a:lstStyle/>
           <a:p>
             <a:r>
-              <a:rPr lang="zh-CN" altLang="en-US"/>
+              <a:rPr lang="zh-CN" altLang="en-US" smtClean="0"/>
               <a:t>单击此处编辑母版标题样式</a:t>
             </a:r>
+            <a:endParaRPr lang="zh-CN" altLang="en-US"/>
           </a:p>
         </p:txBody>
       </p:sp>
@@ -602,37 +608,38 @@
           <a:p>
             <a:pPr lvl="0"/>
             <a:r>
-              <a:rPr lang="zh-CN" altLang="en-US"/>
+              <a:rPr lang="zh-CN" altLang="en-US" smtClean="0"/>
               <a:t>单击此处编辑母版文本样式</a:t>
             </a:r>
           </a:p>
           <a:p>
             <a:pPr lvl="1"/>
             <a:r>
-              <a:rPr lang="zh-CN" altLang="en-US"/>
+              <a:rPr lang="zh-CN" altLang="en-US" smtClean="0"/>
               <a:t>第二级</a:t>
             </a:r>
           </a:p>
           <a:p>
             <a:pPr lvl="2"/>
             <a:r>
-              <a:rPr lang="zh-CN" altLang="en-US"/>
+              <a:rPr lang="zh-CN" altLang="en-US" smtClean="0"/>
               <a:t>第三级</a:t>
             </a:r>
           </a:p>
           <a:p>
             <a:pPr lvl="3"/>
             <a:r>
-              <a:rPr lang="zh-CN" altLang="en-US"/>
+              <a:rPr lang="zh-CN" altLang="en-US" smtClean="0"/>
               <a:t>第四级</a:t>
             </a:r>
           </a:p>
           <a:p>
             <a:pPr lvl="4"/>
             <a:r>
-              <a:rPr lang="zh-CN" altLang="en-US"/>
+              <a:rPr lang="zh-CN" altLang="en-US" smtClean="0"/>
               <a:t>第五级</a:t>
             </a:r>
+            <a:endParaRPr lang="zh-CN" altLang="en-US"/>
           </a:p>
         </p:txBody>
       </p:sp>
@@ -654,7 +661,7 @@
             <a:fld id="{C26AAE33-BF1E-4903-BB73-0456FE4D27DA}" type="datetimeFigureOut">
               <a:rPr lang="zh-CN" altLang="en-US" smtClean="0"/>
               <a:pPr/>
-              <a:t>2017/4/23</a:t>
+              <a:t>2017/5/18</a:t>
             </a:fld>
             <a:endParaRPr lang="zh-CN" altLang="en-US"/>
           </a:p>
@@ -744,9 +751,10 @@
           <a:lstStyle/>
           <a:p>
             <a:r>
-              <a:rPr lang="zh-CN" altLang="en-US"/>
+              <a:rPr lang="zh-CN" altLang="en-US" smtClean="0"/>
               <a:t>单击此处编辑母版标题样式</a:t>
             </a:r>
+            <a:endParaRPr lang="zh-CN" altLang="en-US"/>
           </a:p>
         </p:txBody>
       </p:sp>
@@ -767,37 +775,38 @@
           <a:p>
             <a:pPr lvl="0"/>
             <a:r>
-              <a:rPr lang="zh-CN" altLang="en-US"/>
+              <a:rPr lang="zh-CN" altLang="en-US" smtClean="0"/>
               <a:t>单击此处编辑母版文本样式</a:t>
             </a:r>
           </a:p>
           <a:p>
             <a:pPr lvl="1"/>
             <a:r>
-              <a:rPr lang="zh-CN" altLang="en-US"/>
+              <a:rPr lang="zh-CN" altLang="en-US" smtClean="0"/>
               <a:t>第二级</a:t>
             </a:r>
           </a:p>
           <a:p>
             <a:pPr lvl="2"/>
             <a:r>
-              <a:rPr lang="zh-CN" altLang="en-US"/>
+              <a:rPr lang="zh-CN" altLang="en-US" smtClean="0"/>
               <a:t>第三级</a:t>
             </a:r>
           </a:p>
           <a:p>
             <a:pPr lvl="3"/>
             <a:r>
-              <a:rPr lang="zh-CN" altLang="en-US"/>
+              <a:rPr lang="zh-CN" altLang="en-US" smtClean="0"/>
               <a:t>第四级</a:t>
             </a:r>
           </a:p>
           <a:p>
             <a:pPr lvl="4"/>
             <a:r>
-              <a:rPr lang="zh-CN" altLang="en-US"/>
+              <a:rPr lang="zh-CN" altLang="en-US" smtClean="0"/>
               <a:t>第五级</a:t>
             </a:r>
+            <a:endParaRPr lang="zh-CN" altLang="en-US"/>
           </a:p>
         </p:txBody>
       </p:sp>
@@ -819,7 +828,7 @@
             <a:fld id="{C26AAE33-BF1E-4903-BB73-0456FE4D27DA}" type="datetimeFigureOut">
               <a:rPr lang="zh-CN" altLang="en-US" smtClean="0"/>
               <a:pPr/>
-              <a:t>2017/4/23</a:t>
+              <a:t>2017/5/18</a:t>
             </a:fld>
             <a:endParaRPr lang="zh-CN" altLang="en-US"/>
           </a:p>
@@ -918,9 +927,10 @@
           </a:lstStyle>
           <a:p>
             <a:r>
-              <a:rPr lang="zh-CN" altLang="en-US"/>
+              <a:rPr lang="zh-CN" altLang="en-US" smtClean="0"/>
               <a:t>单击此处编辑母版标题样式</a:t>
             </a:r>
+            <a:endParaRPr lang="zh-CN" altLang="en-US"/>
           </a:p>
         </p:txBody>
       </p:sp>
@@ -1037,7 +1047,7 @@
           <a:p>
             <a:pPr lvl="0"/>
             <a:r>
-              <a:rPr lang="zh-CN" altLang="en-US"/>
+              <a:rPr lang="zh-CN" altLang="en-US" smtClean="0"/>
               <a:t>单击此处编辑母版文本样式</a:t>
             </a:r>
           </a:p>
@@ -1061,7 +1071,7 @@
             <a:fld id="{C26AAE33-BF1E-4903-BB73-0456FE4D27DA}" type="datetimeFigureOut">
               <a:rPr lang="zh-CN" altLang="en-US" smtClean="0"/>
               <a:pPr/>
-              <a:t>2017/4/23</a:t>
+              <a:t>2017/5/18</a:t>
             </a:fld>
             <a:endParaRPr lang="zh-CN" altLang="en-US"/>
           </a:p>
@@ -1151,9 +1161,10 @@
           <a:lstStyle/>
           <a:p>
             <a:r>
-              <a:rPr lang="zh-CN" altLang="en-US"/>
+              <a:rPr lang="zh-CN" altLang="en-US" smtClean="0"/>
               <a:t>单击此处编辑母版标题样式</a:t>
             </a:r>
+            <a:endParaRPr lang="zh-CN" altLang="en-US"/>
           </a:p>
         </p:txBody>
       </p:sp>
@@ -1207,37 +1218,38 @@
           <a:p>
             <a:pPr lvl="0"/>
             <a:r>
-              <a:rPr lang="zh-CN" altLang="en-US"/>
+              <a:rPr lang="zh-CN" altLang="en-US" smtClean="0"/>
               <a:t>单击此处编辑母版文本样式</a:t>
             </a:r>
           </a:p>
           <a:p>
             <a:pPr lvl="1"/>
             <a:r>
-              <a:rPr lang="zh-CN" altLang="en-US"/>
+              <a:rPr lang="zh-CN" altLang="en-US" smtClean="0"/>
               <a:t>第二级</a:t>
             </a:r>
           </a:p>
           <a:p>
             <a:pPr lvl="2"/>
             <a:r>
-              <a:rPr lang="zh-CN" altLang="en-US"/>
+              <a:rPr lang="zh-CN" altLang="en-US" smtClean="0"/>
               <a:t>第三级</a:t>
             </a:r>
           </a:p>
           <a:p>
             <a:pPr lvl="3"/>
             <a:r>
-              <a:rPr lang="zh-CN" altLang="en-US"/>
+              <a:rPr lang="zh-CN" altLang="en-US" smtClean="0"/>
               <a:t>第四级</a:t>
             </a:r>
           </a:p>
           <a:p>
             <a:pPr lvl="4"/>
             <a:r>
-              <a:rPr lang="zh-CN" altLang="en-US"/>
+              <a:rPr lang="zh-CN" altLang="en-US" smtClean="0"/>
               <a:t>第五级</a:t>
             </a:r>
+            <a:endParaRPr lang="zh-CN" altLang="en-US"/>
           </a:p>
         </p:txBody>
       </p:sp>
@@ -1291,37 +1303,38 @@
           <a:p>
             <a:pPr lvl="0"/>
             <a:r>
-              <a:rPr lang="zh-CN" altLang="en-US"/>
+              <a:rPr lang="zh-CN" altLang="en-US" smtClean="0"/>
               <a:t>单击此处编辑母版文本样式</a:t>
             </a:r>
           </a:p>
           <a:p>
             <a:pPr lvl="1"/>
             <a:r>
-              <a:rPr lang="zh-CN" altLang="en-US"/>
+              <a:rPr lang="zh-CN" altLang="en-US" smtClean="0"/>
               <a:t>第二级</a:t>
             </a:r>
           </a:p>
           <a:p>
             <a:pPr lvl="2"/>
             <a:r>
-              <a:rPr lang="zh-CN" altLang="en-US"/>
+              <a:rPr lang="zh-CN" altLang="en-US" smtClean="0"/>
               <a:t>第三级</a:t>
             </a:r>
           </a:p>
           <a:p>
             <a:pPr lvl="3"/>
             <a:r>
-              <a:rPr lang="zh-CN" altLang="en-US"/>
+              <a:rPr lang="zh-CN" altLang="en-US" smtClean="0"/>
               <a:t>第四级</a:t>
             </a:r>
           </a:p>
           <a:p>
             <a:pPr lvl="4"/>
             <a:r>
-              <a:rPr lang="zh-CN" altLang="en-US"/>
+              <a:rPr lang="zh-CN" altLang="en-US" smtClean="0"/>
               <a:t>第五级</a:t>
             </a:r>
+            <a:endParaRPr lang="zh-CN" altLang="en-US"/>
           </a:p>
         </p:txBody>
       </p:sp>
@@ -1343,7 +1356,7 @@
             <a:fld id="{C26AAE33-BF1E-4903-BB73-0456FE4D27DA}" type="datetimeFigureOut">
               <a:rPr lang="zh-CN" altLang="en-US" smtClean="0"/>
               <a:pPr/>
-              <a:t>2017/4/23</a:t>
+              <a:t>2017/5/18</a:t>
             </a:fld>
             <a:endParaRPr lang="zh-CN" altLang="en-US"/>
           </a:p>
@@ -1437,9 +1450,10 @@
           </a:lstStyle>
           <a:p>
             <a:r>
-              <a:rPr lang="zh-CN" altLang="en-US"/>
+              <a:rPr lang="zh-CN" altLang="en-US" smtClean="0"/>
               <a:t>单击此处编辑母版标题样式</a:t>
             </a:r>
+            <a:endParaRPr lang="zh-CN" altLang="en-US"/>
           </a:p>
         </p:txBody>
       </p:sp>
@@ -1502,7 +1516,7 @@
           <a:p>
             <a:pPr lvl="0"/>
             <a:r>
-              <a:rPr lang="zh-CN" altLang="en-US"/>
+              <a:rPr lang="zh-CN" altLang="en-US" smtClean="0"/>
               <a:t>单击此处编辑母版文本样式</a:t>
             </a:r>
           </a:p>
@@ -1558,37 +1572,38 @@
           <a:p>
             <a:pPr lvl="0"/>
             <a:r>
-              <a:rPr lang="zh-CN" altLang="en-US"/>
+              <a:rPr lang="zh-CN" altLang="en-US" smtClean="0"/>
               <a:t>单击此处编辑母版文本样式</a:t>
             </a:r>
           </a:p>
           <a:p>
             <a:pPr lvl="1"/>
             <a:r>
-              <a:rPr lang="zh-CN" altLang="en-US"/>
+              <a:rPr lang="zh-CN" altLang="en-US" smtClean="0"/>
               <a:t>第二级</a:t>
             </a:r>
           </a:p>
           <a:p>
             <a:pPr lvl="2"/>
             <a:r>
-              <a:rPr lang="zh-CN" altLang="en-US"/>
+              <a:rPr lang="zh-CN" altLang="en-US" smtClean="0"/>
               <a:t>第三级</a:t>
             </a:r>
           </a:p>
           <a:p>
             <a:pPr lvl="3"/>
             <a:r>
-              <a:rPr lang="zh-CN" altLang="en-US"/>
+              <a:rPr lang="zh-CN" altLang="en-US" smtClean="0"/>
               <a:t>第四级</a:t>
             </a:r>
           </a:p>
           <a:p>
             <a:pPr lvl="4"/>
             <a:r>
-              <a:rPr lang="zh-CN" altLang="en-US"/>
+              <a:rPr lang="zh-CN" altLang="en-US" smtClean="0"/>
               <a:t>第五级</a:t>
             </a:r>
+            <a:endParaRPr lang="zh-CN" altLang="en-US"/>
           </a:p>
         </p:txBody>
       </p:sp>
@@ -1651,7 +1666,7 @@
           <a:p>
             <a:pPr lvl="0"/>
             <a:r>
-              <a:rPr lang="zh-CN" altLang="en-US"/>
+              <a:rPr lang="zh-CN" altLang="en-US" smtClean="0"/>
               <a:t>单击此处编辑母版文本样式</a:t>
             </a:r>
           </a:p>
@@ -1707,37 +1722,38 @@
           <a:p>
             <a:pPr lvl="0"/>
             <a:r>
-              <a:rPr lang="zh-CN" altLang="en-US"/>
+              <a:rPr lang="zh-CN" altLang="en-US" smtClean="0"/>
               <a:t>单击此处编辑母版文本样式</a:t>
             </a:r>
           </a:p>
           <a:p>
             <a:pPr lvl="1"/>
             <a:r>
-              <a:rPr lang="zh-CN" altLang="en-US"/>
+              <a:rPr lang="zh-CN" altLang="en-US" smtClean="0"/>
               <a:t>第二级</a:t>
             </a:r>
           </a:p>
           <a:p>
             <a:pPr lvl="2"/>
             <a:r>
-              <a:rPr lang="zh-CN" altLang="en-US"/>
+              <a:rPr lang="zh-CN" altLang="en-US" smtClean="0"/>
               <a:t>第三级</a:t>
             </a:r>
           </a:p>
           <a:p>
             <a:pPr lvl="3"/>
             <a:r>
-              <a:rPr lang="zh-CN" altLang="en-US"/>
+              <a:rPr lang="zh-CN" altLang="en-US" smtClean="0"/>
               <a:t>第四级</a:t>
             </a:r>
           </a:p>
           <a:p>
             <a:pPr lvl="4"/>
             <a:r>
-              <a:rPr lang="zh-CN" altLang="en-US"/>
+              <a:rPr lang="zh-CN" altLang="en-US" smtClean="0"/>
               <a:t>第五级</a:t>
             </a:r>
+            <a:endParaRPr lang="zh-CN" altLang="en-US"/>
           </a:p>
         </p:txBody>
       </p:sp>
@@ -1759,7 +1775,7 @@
             <a:fld id="{C26AAE33-BF1E-4903-BB73-0456FE4D27DA}" type="datetimeFigureOut">
               <a:rPr lang="zh-CN" altLang="en-US" smtClean="0"/>
               <a:pPr/>
-              <a:t>2017/4/23</a:t>
+              <a:t>2017/5/18</a:t>
             </a:fld>
             <a:endParaRPr lang="zh-CN" altLang="en-US"/>
           </a:p>
@@ -1849,9 +1865,10 @@
           <a:lstStyle/>
           <a:p>
             <a:r>
-              <a:rPr lang="zh-CN" altLang="en-US"/>
+              <a:rPr lang="zh-CN" altLang="en-US" smtClean="0"/>
               <a:t>单击此处编辑母版标题样式</a:t>
             </a:r>
+            <a:endParaRPr lang="zh-CN" altLang="en-US"/>
           </a:p>
         </p:txBody>
       </p:sp>
@@ -1873,7 +1890,7 @@
             <a:fld id="{C26AAE33-BF1E-4903-BB73-0456FE4D27DA}" type="datetimeFigureOut">
               <a:rPr lang="zh-CN" altLang="en-US" smtClean="0"/>
               <a:pPr/>
-              <a:t>2017/4/23</a:t>
+              <a:t>2017/5/18</a:t>
             </a:fld>
             <a:endParaRPr lang="zh-CN" altLang="en-US"/>
           </a:p>
@@ -1965,7 +1982,7 @@
             <a:fld id="{C26AAE33-BF1E-4903-BB73-0456FE4D27DA}" type="datetimeFigureOut">
               <a:rPr lang="zh-CN" altLang="en-US" smtClean="0"/>
               <a:pPr/>
-              <a:t>2017/4/23</a:t>
+              <a:t>2017/5/18</a:t>
             </a:fld>
             <a:endParaRPr lang="zh-CN" altLang="en-US"/>
           </a:p>
@@ -2064,9 +2081,10 @@
           </a:lstStyle>
           <a:p>
             <a:r>
-              <a:rPr lang="zh-CN" altLang="en-US"/>
+              <a:rPr lang="zh-CN" altLang="en-US" smtClean="0"/>
               <a:t>单击此处编辑母版标题样式</a:t>
             </a:r>
+            <a:endParaRPr lang="zh-CN" altLang="en-US"/>
           </a:p>
         </p:txBody>
       </p:sp>
@@ -2120,37 +2138,38 @@
           <a:p>
             <a:pPr lvl="0"/>
             <a:r>
-              <a:rPr lang="zh-CN" altLang="en-US"/>
+              <a:rPr lang="zh-CN" altLang="en-US" smtClean="0"/>
               <a:t>单击此处编辑母版文本样式</a:t>
             </a:r>
           </a:p>
           <a:p>
             <a:pPr lvl="1"/>
             <a:r>
-              <a:rPr lang="zh-CN" altLang="en-US"/>
+              <a:rPr lang="zh-CN" altLang="en-US" smtClean="0"/>
               <a:t>第二级</a:t>
             </a:r>
           </a:p>
           <a:p>
             <a:pPr lvl="2"/>
             <a:r>
-              <a:rPr lang="zh-CN" altLang="en-US"/>
+              <a:rPr lang="zh-CN" altLang="en-US" smtClean="0"/>
               <a:t>第三级</a:t>
             </a:r>
           </a:p>
           <a:p>
             <a:pPr lvl="3"/>
             <a:r>
-              <a:rPr lang="zh-CN" altLang="en-US"/>
+              <a:rPr lang="zh-CN" altLang="en-US" smtClean="0"/>
               <a:t>第四级</a:t>
             </a:r>
           </a:p>
           <a:p>
             <a:pPr lvl="4"/>
             <a:r>
-              <a:rPr lang="zh-CN" altLang="en-US"/>
+              <a:rPr lang="zh-CN" altLang="en-US" smtClean="0"/>
               <a:t>第五级</a:t>
             </a:r>
+            <a:endParaRPr lang="zh-CN" altLang="en-US"/>
           </a:p>
         </p:txBody>
       </p:sp>
@@ -2213,7 +2232,7 @@
           <a:p>
             <a:pPr lvl="0"/>
             <a:r>
-              <a:rPr lang="zh-CN" altLang="en-US"/>
+              <a:rPr lang="zh-CN" altLang="en-US" smtClean="0"/>
               <a:t>单击此处编辑母版文本样式</a:t>
             </a:r>
           </a:p>
@@ -2237,7 +2256,7 @@
             <a:fld id="{C26AAE33-BF1E-4903-BB73-0456FE4D27DA}" type="datetimeFigureOut">
               <a:rPr lang="zh-CN" altLang="en-US" smtClean="0"/>
               <a:pPr/>
-              <a:t>2017/4/23</a:t>
+              <a:t>2017/5/18</a:t>
             </a:fld>
             <a:endParaRPr lang="zh-CN" altLang="en-US"/>
           </a:p>
@@ -2336,9 +2355,10 @@
           </a:lstStyle>
           <a:p>
             <a:r>
-              <a:rPr lang="zh-CN" altLang="en-US"/>
+              <a:rPr lang="zh-CN" altLang="en-US" smtClean="0"/>
               <a:t>单击此处编辑母版标题样式</a:t>
             </a:r>
+            <a:endParaRPr lang="zh-CN" altLang="en-US"/>
           </a:p>
         </p:txBody>
       </p:sp>
@@ -2462,7 +2482,7 @@
           <a:p>
             <a:pPr lvl="0"/>
             <a:r>
-              <a:rPr lang="zh-CN" altLang="en-US"/>
+              <a:rPr lang="zh-CN" altLang="en-US" smtClean="0"/>
               <a:t>单击此处编辑母版文本样式</a:t>
             </a:r>
           </a:p>
@@ -2486,7 +2506,7 @@
             <a:fld id="{C26AAE33-BF1E-4903-BB73-0456FE4D27DA}" type="datetimeFigureOut">
               <a:rPr lang="zh-CN" altLang="en-US" smtClean="0"/>
               <a:pPr/>
-              <a:t>2017/4/23</a:t>
+              <a:t>2017/5/18</a:t>
             </a:fld>
             <a:endParaRPr lang="zh-CN" altLang="en-US"/>
           </a:p>
@@ -2548,7 +2568,7 @@
   <p:cSld>
     <p:bg>
       <p:bgRef idx="1001">
-        <a:schemeClr val="bg1"/>
+        <a:schemeClr val="bg2"/>
       </p:bgRef>
     </p:bg>
     <p:spTree>
@@ -2591,9 +2611,10 @@
           <a:lstStyle/>
           <a:p>
             <a:r>
-              <a:rPr lang="zh-CN" altLang="en-US"/>
+              <a:rPr lang="zh-CN" altLang="en-US" dirty="0" smtClean="0"/>
               <a:t>单击此处编辑母版标题样式</a:t>
             </a:r>
+            <a:endParaRPr lang="zh-CN" altLang="en-US" dirty="0"/>
           </a:p>
         </p:txBody>
       </p:sp>
@@ -2624,37 +2645,38 @@
           <a:p>
             <a:pPr lvl="0"/>
             <a:r>
-              <a:rPr lang="zh-CN" altLang="en-US"/>
+              <a:rPr lang="zh-CN" altLang="en-US" dirty="0" smtClean="0"/>
               <a:t>单击此处编辑母版文本样式</a:t>
             </a:r>
           </a:p>
           <a:p>
             <a:pPr lvl="1"/>
             <a:r>
-              <a:rPr lang="zh-CN" altLang="en-US"/>
+              <a:rPr lang="zh-CN" altLang="en-US" dirty="0" smtClean="0"/>
               <a:t>第二级</a:t>
             </a:r>
           </a:p>
           <a:p>
             <a:pPr lvl="2"/>
             <a:r>
-              <a:rPr lang="zh-CN" altLang="en-US"/>
+              <a:rPr lang="zh-CN" altLang="en-US" dirty="0" smtClean="0"/>
               <a:t>第三级</a:t>
             </a:r>
           </a:p>
           <a:p>
             <a:pPr lvl="3"/>
             <a:r>
-              <a:rPr lang="zh-CN" altLang="en-US"/>
+              <a:rPr lang="zh-CN" altLang="en-US" dirty="0" smtClean="0"/>
               <a:t>第四级</a:t>
             </a:r>
           </a:p>
           <a:p>
             <a:pPr lvl="4"/>
             <a:r>
-              <a:rPr lang="zh-CN" altLang="en-US"/>
+              <a:rPr lang="zh-CN" altLang="en-US" dirty="0" smtClean="0"/>
               <a:t>第五级</a:t>
             </a:r>
+            <a:endParaRPr lang="zh-CN" altLang="en-US" dirty="0"/>
           </a:p>
         </p:txBody>
       </p:sp>
@@ -2687,6 +2709,7 @@
                     <a:tint val="75000"/>
                   </a:schemeClr>
                 </a:solidFill>
+                <a:ea typeface="等线" pitchFamily="2" charset="-122"/>
               </a:defRPr>
             </a:lvl1pPr>
           </a:lstStyle>
@@ -2694,9 +2717,9 @@
             <a:fld id="{C26AAE33-BF1E-4903-BB73-0456FE4D27DA}" type="datetimeFigureOut">
               <a:rPr lang="zh-CN" altLang="en-US" smtClean="0"/>
               <a:pPr/>
-              <a:t>2017/4/23</a:t>
+              <a:t>2017/5/18</a:t>
             </a:fld>
-            <a:endParaRPr lang="zh-CN" altLang="en-US"/>
+            <a:endParaRPr lang="zh-CN" altLang="en-US" dirty="0"/>
           </a:p>
         </p:txBody>
       </p:sp>
@@ -2729,11 +2752,12 @@
                     <a:tint val="75000"/>
                   </a:schemeClr>
                 </a:solidFill>
+                <a:ea typeface="等线" pitchFamily="2" charset="-122"/>
               </a:defRPr>
             </a:lvl1pPr>
           </a:lstStyle>
           <a:p>
-            <a:endParaRPr lang="zh-CN" altLang="en-US"/>
+            <a:endParaRPr lang="zh-CN" altLang="en-US" dirty="0"/>
           </a:p>
         </p:txBody>
       </p:sp>
@@ -2766,6 +2790,7 @@
                     <a:tint val="75000"/>
                   </a:schemeClr>
                 </a:solidFill>
+                <a:ea typeface="等线" pitchFamily="2" charset="-122"/>
               </a:defRPr>
             </a:lvl1pPr>
           </a:lstStyle>
@@ -2775,7 +2800,7 @@
               <a:pPr/>
               <a:t>‹#›</a:t>
             </a:fld>
-            <a:endParaRPr lang="zh-CN" altLang="en-US"/>
+            <a:endParaRPr lang="zh-CN" altLang="en-US" dirty="0"/>
           </a:p>
         </p:txBody>
       </p:sp>
@@ -2783,17 +2808,17 @@
   </p:cSld>
   <p:clrMap bg1="lt1" tx1="dk1" bg2="lt2" tx2="dk2" accent1="accent1" accent2="accent2" accent3="accent3" accent4="accent4" accent5="accent5" accent6="accent6" hlink="hlink" folHlink="folHlink"/>
   <p:sldLayoutIdLst>
-    <p:sldLayoutId id="2147483649" r:id="rId1"/>
-    <p:sldLayoutId id="2147483650" r:id="rId2"/>
-    <p:sldLayoutId id="2147483651" r:id="rId3"/>
-    <p:sldLayoutId id="2147483652" r:id="rId4"/>
-    <p:sldLayoutId id="2147483653" r:id="rId5"/>
-    <p:sldLayoutId id="2147483654" r:id="rId6"/>
-    <p:sldLayoutId id="2147483655" r:id="rId7"/>
-    <p:sldLayoutId id="2147483656" r:id="rId8"/>
-    <p:sldLayoutId id="2147483657" r:id="rId9"/>
-    <p:sldLayoutId id="2147483658" r:id="rId10"/>
-    <p:sldLayoutId id="2147483659" r:id="rId11"/>
+    <p:sldLayoutId id="2147483769" r:id="rId1"/>
+    <p:sldLayoutId id="2147483770" r:id="rId2"/>
+    <p:sldLayoutId id="2147483771" r:id="rId3"/>
+    <p:sldLayoutId id="2147483772" r:id="rId4"/>
+    <p:sldLayoutId id="2147483773" r:id="rId5"/>
+    <p:sldLayoutId id="2147483774" r:id="rId6"/>
+    <p:sldLayoutId id="2147483775" r:id="rId7"/>
+    <p:sldLayoutId id="2147483776" r:id="rId8"/>
+    <p:sldLayoutId id="2147483777" r:id="rId9"/>
+    <p:sldLayoutId id="2147483778" r:id="rId10"/>
+    <p:sldLayoutId id="2147483779" r:id="rId11"/>
   </p:sldLayoutIdLst>
   <p:txStyles>
     <p:titleStyle>
@@ -2807,7 +2832,7 @@
             <a:schemeClr val="tx1"/>
           </a:solidFill>
           <a:latin typeface="+mj-lt"/>
-          <a:ea typeface="+mj-ea"/>
+          <a:ea typeface="等线" pitchFamily="2" charset="-122"/>
           <a:cs typeface="+mj-cs"/>
         </a:defRPr>
       </a:lvl1pPr>
@@ -2824,7 +2849,7 @@
             <a:schemeClr val="tx1"/>
           </a:solidFill>
           <a:latin typeface="+mn-lt"/>
-          <a:ea typeface="+mn-ea"/>
+          <a:ea typeface="等线" pitchFamily="2" charset="-122"/>
           <a:cs typeface="+mn-cs"/>
         </a:defRPr>
       </a:lvl1pPr>
@@ -2839,7 +2864,7 @@
             <a:schemeClr val="tx1"/>
           </a:solidFill>
           <a:latin typeface="+mn-lt"/>
-          <a:ea typeface="+mn-ea"/>
+          <a:ea typeface="等线" pitchFamily="2" charset="-122"/>
           <a:cs typeface="+mn-cs"/>
         </a:defRPr>
       </a:lvl2pPr>
@@ -2854,7 +2879,7 @@
             <a:schemeClr val="tx1"/>
           </a:solidFill>
           <a:latin typeface="+mn-lt"/>
-          <a:ea typeface="+mn-ea"/>
+          <a:ea typeface="等线" pitchFamily="2" charset="-122"/>
           <a:cs typeface="+mn-cs"/>
         </a:defRPr>
       </a:lvl3pPr>
@@ -2869,7 +2894,7 @@
             <a:schemeClr val="tx1"/>
           </a:solidFill>
           <a:latin typeface="+mn-lt"/>
-          <a:ea typeface="+mn-ea"/>
+          <a:ea typeface="等线" pitchFamily="2" charset="-122"/>
           <a:cs typeface="+mn-cs"/>
         </a:defRPr>
       </a:lvl4pPr>
@@ -2884,7 +2909,7 @@
             <a:schemeClr val="tx1"/>
           </a:solidFill>
           <a:latin typeface="+mn-lt"/>
-          <a:ea typeface="+mn-ea"/>
+          <a:ea typeface="等线" pitchFamily="2" charset="-122"/>
           <a:cs typeface="+mn-cs"/>
         </a:defRPr>
       </a:lvl5pPr>
@@ -3081,13 +3106,30 @@
           <a:lstStyle/>
           <a:p>
             <a:r>
-              <a:rPr lang="en-US" altLang="zh-CN" dirty="0"/>
+              <a:rPr lang="en-US" altLang="zh-CN" dirty="0">
+                <a:latin typeface="等线" pitchFamily="2" charset="-122"/>
+                <a:ea typeface="等线" pitchFamily="2" charset="-122"/>
+              </a:rPr>
               <a:t>PMS</a:t>
             </a:r>
             <a:r>
-              <a:rPr lang="zh-CN" altLang="en-US" dirty="0"/>
-              <a:t>生产管理系统</a:t>
-            </a:r>
+              <a:rPr lang="zh-CN" altLang="en-US" dirty="0">
+                <a:latin typeface="等线" pitchFamily="2" charset="-122"/>
+                <a:ea typeface="等线" pitchFamily="2" charset="-122"/>
+              </a:rPr>
+              <a:t>生产</a:t>
+            </a:r>
+            <a:r>
+              <a:rPr lang="zh-CN" altLang="en-US" dirty="0" smtClean="0">
+                <a:latin typeface="等线" pitchFamily="2" charset="-122"/>
+                <a:ea typeface="等线" pitchFamily="2" charset="-122"/>
+              </a:rPr>
+              <a:t>管理系统设计介绍</a:t>
+            </a:r>
+            <a:endParaRPr lang="zh-CN" altLang="en-US" dirty="0">
+              <a:latin typeface="等线" pitchFamily="2" charset="-122"/>
+              <a:ea typeface="等线" pitchFamily="2" charset="-122"/>
+            </a:endParaRPr>
           </a:p>
         </p:txBody>
       </p:sp>
@@ -3106,7 +3148,29 @@
           <a:bodyPr/>
           <a:lstStyle/>
           <a:p>
-            <a:endParaRPr lang="zh-CN" altLang="en-US"/>
+            <a:r>
+              <a:rPr lang="en-US" altLang="zh-CN" dirty="0" err="1" smtClean="0">
+                <a:latin typeface="等线" pitchFamily="2" charset="-122"/>
+                <a:ea typeface="等线" pitchFamily="2" charset="-122"/>
+              </a:rPr>
+              <a:t>xs.zhou</a:t>
+            </a:r>
+            <a:endParaRPr lang="en-US" altLang="zh-CN" dirty="0" smtClean="0">
+              <a:latin typeface="等线" pitchFamily="2" charset="-122"/>
+              <a:ea typeface="等线" pitchFamily="2" charset="-122"/>
+            </a:endParaRPr>
+          </a:p>
+          <a:p>
+            <a:r>
+              <a:rPr lang="en-US" altLang="zh-CN" dirty="0" smtClean="0">
+                <a:latin typeface="等线" pitchFamily="2" charset="-122"/>
+              </a:rPr>
+              <a:t>2017</a:t>
+            </a:r>
+            <a:endParaRPr lang="zh-CN" altLang="en-US" dirty="0">
+              <a:latin typeface="等线" pitchFamily="2" charset="-122"/>
+              <a:ea typeface="等线" pitchFamily="2" charset="-122"/>
+            </a:endParaRPr>
           </a:p>
         </p:txBody>
       </p:sp>
@@ -3150,9 +3214,10 @@
           <a:bodyPr/>
           <a:lstStyle/>
           <a:p>
-            <a:r>
-              <a:rPr lang="zh-CN" altLang="en-US" dirty="0" smtClean="0"/>
-              <a:t>作废设计</a:t>
+            <a:pPr algn="l"/>
+            <a:r>
+              <a:rPr lang="zh-CN" altLang="en-US" dirty="0" smtClean="0"/>
+              <a:t>快照设计（脚印系统）</a:t>
             </a:r>
             <a:endParaRPr lang="zh-CN" altLang="en-US" dirty="0"/>
           </a:p>
@@ -3175,28 +3240,21 @@
           <a:p>
             <a:r>
               <a:rPr lang="zh-CN" altLang="en-US" dirty="0" smtClean="0"/>
-              <a:t>本系统没有使用真正的删除设计，而是采用类似回收站的方式虚拟删除，防止数据误删时间发生。</a:t>
+              <a:t>所有更改操作都会在更改之前触发一个快照动作，将更改前的当前数据“冻结”后存入快照记录，更改一次，冻结存储一次，这个过程是服务器自动进行的，人不参与。</a:t>
             </a:r>
             <a:endParaRPr lang="en-US" altLang="zh-CN" dirty="0" smtClean="0"/>
           </a:p>
           <a:p>
             <a:r>
               <a:rPr lang="zh-CN" altLang="en-US" dirty="0" smtClean="0"/>
-              <a:t>所有数据一经录入，会一直存在服务器中。</a:t>
+              <a:t>目的防止无意更改，应对恶意更改；</a:t>
             </a:r>
             <a:endParaRPr lang="en-US" altLang="zh-CN" dirty="0" smtClean="0"/>
           </a:p>
           <a:p>
             <a:r>
               <a:rPr lang="zh-CN" altLang="en-US" dirty="0" smtClean="0"/>
-              <a:t>数据只能标记为作废，标记后，数据将不再被发送到客户端</a:t>
-            </a:r>
-            <a:endParaRPr lang="en-US" altLang="zh-CN" dirty="0" smtClean="0"/>
-          </a:p>
-          <a:p>
-            <a:r>
-              <a:rPr lang="zh-CN" altLang="en-US" dirty="0" smtClean="0"/>
-              <a:t>作废的数据，只有管理员可以访问到。</a:t>
+              <a:t>提供接口可以访问只读的快照记录。</a:t>
             </a:r>
             <a:endParaRPr lang="en-US" altLang="zh-CN" dirty="0" smtClean="0"/>
           </a:p>
@@ -3242,9 +3300,10 @@
           <a:bodyPr/>
           <a:lstStyle/>
           <a:p>
-            <a:r>
-              <a:rPr lang="zh-CN" altLang="en-US" dirty="0" smtClean="0"/>
-              <a:t>基本编号</a:t>
+            <a:pPr algn="l"/>
+            <a:r>
+              <a:rPr lang="zh-CN" altLang="en-US" dirty="0" smtClean="0"/>
+              <a:t>权限设计</a:t>
             </a:r>
             <a:endParaRPr lang="zh-CN" altLang="en-US" dirty="0"/>
           </a:p>
@@ -3267,47 +3326,33 @@
           <a:p>
             <a:r>
               <a:rPr lang="zh-CN" altLang="en-US" dirty="0" smtClean="0"/>
-              <a:t>类似股票代码，提供唯一的，能够快捷确认信息记录的编号</a:t>
+              <a:t>每个人都有自己的账号</a:t>
             </a:r>
             <a:endParaRPr lang="en-US" altLang="zh-CN" dirty="0" smtClean="0"/>
           </a:p>
           <a:p>
             <a:r>
               <a:rPr lang="zh-CN" altLang="en-US" dirty="0" smtClean="0"/>
-              <a:t>订单对应内部工作号</a:t>
-            </a:r>
-            <a:r>
-              <a:rPr lang="en-US" altLang="zh-CN" dirty="0" err="1" smtClean="0"/>
-              <a:t>PMINumber</a:t>
+              <a:t>权限分配针对角色</a:t>
+            </a:r>
+            <a:r>
+              <a:rPr lang="en-US" altLang="zh-CN" dirty="0" smtClean="0"/>
+              <a:t>Role</a:t>
+            </a:r>
+            <a:r>
+              <a:rPr lang="zh-CN" altLang="en-US" dirty="0" smtClean="0"/>
+              <a:t>进行，然后每个人分配角色，同样的角色拥有同样的权限</a:t>
+            </a:r>
+            <a:r>
+              <a:rPr lang="zh-CN" altLang="en-US" dirty="0" smtClean="0"/>
+              <a:t>。</a:t>
             </a:r>
             <a:endParaRPr lang="en-US" altLang="zh-CN" dirty="0" smtClean="0"/>
           </a:p>
           <a:p>
             <a:r>
               <a:rPr lang="zh-CN" altLang="en-US" dirty="0" smtClean="0"/>
-              <a:t>原料订单对应原料订单编号</a:t>
-            </a:r>
-            <a:r>
-              <a:rPr lang="en-US" altLang="zh-CN" dirty="0" smtClean="0"/>
-              <a:t>+</a:t>
-            </a:r>
-            <a:r>
-              <a:rPr lang="zh-CN" altLang="en-US" dirty="0" smtClean="0"/>
-              <a:t>原料订单项编号</a:t>
-            </a:r>
-            <a:endParaRPr lang="en-US" altLang="zh-CN" dirty="0" smtClean="0"/>
-          </a:p>
-          <a:p>
-            <a:r>
-              <a:rPr lang="zh-CN" altLang="en-US" dirty="0" smtClean="0"/>
-              <a:t>热压对应热压编号</a:t>
-            </a:r>
-            <a:endParaRPr lang="en-US" altLang="zh-CN" dirty="0" smtClean="0"/>
-          </a:p>
-          <a:p>
-            <a:r>
-              <a:rPr lang="zh-CN" altLang="en-US" dirty="0" smtClean="0"/>
-              <a:t>背板对应背板编号</a:t>
+              <a:t>可做出授权和取消授权的操作</a:t>
             </a:r>
             <a:endParaRPr lang="zh-CN" altLang="en-US" dirty="0"/>
           </a:p>
@@ -3353,10 +3398,12 @@
           <a:bodyPr/>
           <a:lstStyle/>
           <a:p>
-            <a:r>
-              <a:rPr lang="zh-CN" altLang="en-US" dirty="0"/>
-              <a:t>实际试用</a:t>
-            </a:r>
+            <a:pPr algn="l"/>
+            <a:r>
+              <a:rPr lang="zh-CN" altLang="en-US" dirty="0" smtClean="0"/>
+              <a:t>数据备份</a:t>
+            </a:r>
+            <a:endParaRPr lang="zh-CN" altLang="en-US" dirty="0"/>
           </a:p>
         </p:txBody>
       </p:sp>
@@ -3376,21 +3423,135 @@
           <a:lstStyle/>
           <a:p>
             <a:r>
-              <a:rPr lang="en-US" altLang="zh-CN" dirty="0"/>
+              <a:rPr lang="zh-CN" altLang="en-US" dirty="0" smtClean="0"/>
+              <a:t>服务器硬盘采用的</a:t>
+            </a:r>
+            <a:r>
+              <a:rPr lang="en-US" altLang="zh-CN" dirty="0" smtClean="0"/>
+              <a:t>Raid1</a:t>
+            </a:r>
+            <a:r>
+              <a:rPr lang="zh-CN" altLang="en-US" dirty="0" smtClean="0"/>
+              <a:t>冗余设计，只要两个硬盘不同是坏掉，数据就不会丢失。</a:t>
+            </a:r>
+            <a:endParaRPr lang="en-US" altLang="zh-CN" dirty="0" smtClean="0"/>
+          </a:p>
+          <a:p>
+            <a:r>
+              <a:rPr lang="zh-CN" altLang="en-US" dirty="0" smtClean="0"/>
+              <a:t>数据库备份是每半小时备份一次。</a:t>
+            </a:r>
+            <a:endParaRPr lang="en-US" altLang="zh-CN" dirty="0" smtClean="0"/>
+          </a:p>
+          <a:p>
+            <a:r>
+              <a:rPr lang="zh-CN" altLang="en-US" dirty="0" smtClean="0"/>
+              <a:t>管理员会人工每周会从服务器备份数据到别的计算机。</a:t>
+            </a:r>
+            <a:endParaRPr lang="zh-CN" altLang="en-US" dirty="0"/>
+          </a:p>
+        </p:txBody>
+      </p:sp>
+    </p:spTree>
+  </p:cSld>
+  <p:clrMapOvr>
+    <a:masterClrMapping/>
+  </p:clrMapOvr>
+</p:sld>
+</file>
+
+<file path=ppt/slides/slide13.xml><?xml version="1.0" encoding="utf-8"?>
+<p:sld xmlns:a="http://schemas.openxmlformats.org/drawingml/2006/main" xmlns:r="http://schemas.openxmlformats.org/officeDocument/2006/relationships" xmlns:p="http://schemas.openxmlformats.org/presentationml/2006/main">
+  <p:cSld>
+    <p:spTree>
+      <p:nvGrpSpPr>
+        <p:cNvPr id="1" name=""/>
+        <p:cNvGrpSpPr/>
+        <p:nvPr/>
+      </p:nvGrpSpPr>
+      <p:grpSpPr>
+        <a:xfrm>
+          <a:off x="0" y="0"/>
+          <a:ext cx="0" cy="0"/>
+          <a:chOff x="0" y="0"/>
+          <a:chExt cx="0" cy="0"/>
+        </a:xfrm>
+      </p:grpSpPr>
+      <p:sp>
+        <p:nvSpPr>
+          <p:cNvPr id="2" name="标题 1"/>
+          <p:cNvSpPr>
+            <a:spLocks noGrp="1"/>
+          </p:cNvSpPr>
+          <p:nvPr>
+            <p:ph type="title"/>
+          </p:nvPr>
+        </p:nvSpPr>
+        <p:spPr/>
+        <p:txBody>
+          <a:bodyPr/>
+          <a:lstStyle/>
+          <a:p>
+            <a:pPr algn="l"/>
+            <a:r>
+              <a:rPr lang="zh-CN" altLang="en-US" dirty="0" smtClean="0"/>
+              <a:t>实际部署</a:t>
+            </a:r>
+            <a:endParaRPr lang="zh-CN" altLang="en-US" dirty="0"/>
+          </a:p>
+        </p:txBody>
+      </p:sp>
+      <p:sp>
+        <p:nvSpPr>
+          <p:cNvPr id="3" name="内容占位符 2"/>
+          <p:cNvSpPr>
+            <a:spLocks noGrp="1"/>
+          </p:cNvSpPr>
+          <p:nvPr>
+            <p:ph idx="1"/>
+          </p:nvPr>
+        </p:nvSpPr>
+        <p:spPr/>
+        <p:txBody>
+          <a:bodyPr/>
+          <a:lstStyle/>
+          <a:p>
+            <a:r>
+              <a:rPr lang="en-US" altLang="zh-CN" dirty="0" smtClean="0"/>
               <a:t>2017/4/17</a:t>
             </a:r>
             <a:r>
-              <a:rPr lang="zh-CN" altLang="en-US" dirty="0"/>
-              <a:t>号测试</a:t>
-            </a:r>
-            <a:r>
-              <a:rPr lang="en-US" altLang="zh-CN" dirty="0"/>
+              <a:rPr lang="zh-CN" altLang="en-US" dirty="0" smtClean="0"/>
+              <a:t> 试用</a:t>
+            </a:r>
+            <a:r>
+              <a:rPr lang="en-US" altLang="zh-CN" dirty="0" smtClean="0"/>
               <a:t>4.0.0.0</a:t>
             </a:r>
             <a:r>
-              <a:rPr lang="zh-CN" altLang="en-US"/>
-              <a:t>版本</a:t>
-            </a:r>
+              <a:rPr lang="zh-CN" altLang="en-US" dirty="0" smtClean="0"/>
+              <a:t>测试版</a:t>
+            </a:r>
+            <a:endParaRPr lang="en-US" altLang="zh-CN" dirty="0" smtClean="0"/>
+          </a:p>
+          <a:p>
+            <a:r>
+              <a:rPr lang="en-US" altLang="zh-CN" dirty="0" smtClean="0"/>
+              <a:t>2017/5/19 </a:t>
+            </a:r>
+            <a:r>
+              <a:rPr lang="zh-CN" altLang="en-US" dirty="0" smtClean="0"/>
+              <a:t>使用</a:t>
+            </a:r>
+            <a:r>
+              <a:rPr lang="en-US" altLang="zh-CN" dirty="0" smtClean="0"/>
+              <a:t>4.1.0.0</a:t>
+            </a:r>
+            <a:r>
+              <a:rPr lang="zh-CN" altLang="en-US" dirty="0" smtClean="0"/>
+              <a:t>正式版</a:t>
+            </a:r>
+            <a:endParaRPr lang="zh-CN" altLang="en-US" dirty="0"/>
           </a:p>
         </p:txBody>
       </p:sp>
@@ -3434,9 +3595,14 @@
           <a:bodyPr/>
           <a:lstStyle/>
           <a:p>
+            <a:pPr algn="l"/>
+            <a:r>
+              <a:rPr lang="zh-CN" altLang="en-US" dirty="0" smtClean="0"/>
+              <a:t>要</a:t>
+            </a:r>
             <a:r>
               <a:rPr lang="zh-CN" altLang="en-US" dirty="0"/>
-              <a:t>要解决的问题</a:t>
+              <a:t>解决的问题</a:t>
             </a:r>
           </a:p>
         </p:txBody>
@@ -3458,35 +3624,31 @@
           <a:p>
             <a:r>
               <a:rPr lang="zh-CN" altLang="en-US" dirty="0" smtClean="0"/>
-              <a:t>大幅减少</a:t>
-            </a:r>
-            <a:r>
-              <a:rPr lang="zh-CN" altLang="en-US" dirty="0"/>
-              <a:t>犯错</a:t>
+              <a:t>清晰流程权责</a:t>
+            </a:r>
+            <a:endParaRPr lang="en-US" altLang="zh-CN" dirty="0" smtClean="0"/>
+          </a:p>
+          <a:p>
+            <a:r>
+              <a:rPr lang="zh-CN" altLang="en-US" dirty="0" smtClean="0"/>
+              <a:t>减少人为错误</a:t>
             </a:r>
             <a:endParaRPr lang="en-US" altLang="zh-CN" dirty="0"/>
           </a:p>
           <a:p>
             <a:r>
-              <a:rPr lang="zh-CN" altLang="en-US" dirty="0"/>
-              <a:t>清晰</a:t>
-            </a:r>
-            <a:r>
-              <a:rPr lang="zh-CN" altLang="en-US" dirty="0" smtClean="0"/>
-              <a:t>流程权责</a:t>
+              <a:rPr lang="zh-CN" altLang="en-US" dirty="0" smtClean="0"/>
+              <a:t>提高</a:t>
+            </a:r>
+            <a:r>
+              <a:rPr lang="zh-CN" altLang="en-US" dirty="0" smtClean="0"/>
+              <a:t>工作效率</a:t>
             </a:r>
             <a:endParaRPr lang="en-US" altLang="zh-CN" dirty="0"/>
           </a:p>
           <a:p>
             <a:r>
               <a:rPr lang="zh-CN" altLang="en-US" dirty="0" smtClean="0"/>
-              <a:t>提高工作效率</a:t>
-            </a:r>
-            <a:endParaRPr lang="en-US" altLang="zh-CN" dirty="0"/>
-          </a:p>
-          <a:p>
-            <a:r>
-              <a:rPr lang="zh-CN" altLang="en-US" dirty="0" smtClean="0"/>
               <a:t>消除重复劳动</a:t>
             </a:r>
             <a:endParaRPr lang="en-US" altLang="zh-CN" dirty="0" smtClean="0"/>
@@ -3494,7 +3656,7 @@
           <a:p>
             <a:r>
               <a:rPr lang="zh-CN" altLang="en-US" dirty="0" smtClean="0"/>
-              <a:t>解放宝贵人力</a:t>
+              <a:t>减少人员需求</a:t>
             </a:r>
             <a:endParaRPr lang="zh-CN" altLang="en-US" dirty="0"/>
           </a:p>
@@ -3540,9 +3702,14 @@
           <a:bodyPr/>
           <a:lstStyle/>
           <a:p>
+            <a:pPr algn="l"/>
+            <a:r>
+              <a:rPr lang="zh-CN" altLang="en-US" dirty="0" smtClean="0"/>
+              <a:t>基本</a:t>
+            </a:r>
             <a:r>
               <a:rPr lang="zh-CN" altLang="en-US" dirty="0"/>
-              <a:t>基本架构</a:t>
+              <a:t>架构</a:t>
             </a:r>
           </a:p>
         </p:txBody>
@@ -3572,7 +3739,19 @@
             <a:pPr lvl="1"/>
             <a:r>
               <a:rPr lang="zh-CN" altLang="en-US" dirty="0"/>
-              <a:t>服务器：提供所需要的服务</a:t>
+              <a:t>服务器：提供所需要</a:t>
+            </a:r>
+            <a:r>
+              <a:rPr lang="zh-CN" altLang="en-US" dirty="0" smtClean="0"/>
+              <a:t>的</a:t>
+            </a:r>
+            <a:r>
+              <a:rPr lang="en-US" altLang="zh-CN" dirty="0" smtClean="0"/>
+              <a:t>API</a:t>
+            </a:r>
+            <a:r>
+              <a:rPr lang="zh-CN" altLang="en-US" dirty="0" smtClean="0"/>
+              <a:t>服务</a:t>
             </a:r>
             <a:endParaRPr lang="en-US" altLang="zh-CN" dirty="0"/>
           </a:p>
@@ -3594,17 +3773,26 @@
           <a:p>
             <a:pPr lvl="1"/>
             <a:r>
+              <a:rPr lang="zh-CN" altLang="en-US" dirty="0" smtClean="0"/>
+              <a:t>从服务器端读取数据</a:t>
+            </a:r>
+            <a:endParaRPr lang="en-US" altLang="zh-CN" dirty="0"/>
+          </a:p>
+          <a:p>
+            <a:pPr lvl="1"/>
+            <a:r>
+              <a:rPr lang="zh-CN" altLang="en-US" dirty="0" smtClean="0"/>
+              <a:t>写数据</a:t>
+            </a:r>
+            <a:r>
               <a:rPr lang="zh-CN" altLang="en-US" dirty="0"/>
-              <a:t>读取服务器数据</a:t>
-            </a:r>
-            <a:endParaRPr lang="en-US" altLang="zh-CN" dirty="0"/>
-          </a:p>
-          <a:p>
-            <a:pPr lvl="1"/>
-            <a:r>
-              <a:rPr lang="zh-CN" altLang="en-US" dirty="0"/>
-              <a:t>写入数据到服务器数据库</a:t>
-            </a:r>
+              <a:t>到</a:t>
+            </a:r>
+            <a:r>
+              <a:rPr lang="zh-CN" altLang="en-US" dirty="0" smtClean="0"/>
+              <a:t>服务端</a:t>
+            </a:r>
+            <a:endParaRPr lang="zh-CN" altLang="en-US" dirty="0"/>
           </a:p>
         </p:txBody>
       </p:sp>
@@ -3648,139 +3836,571 @@
           <a:bodyPr/>
           <a:lstStyle/>
           <a:p>
+            <a:pPr algn="l"/>
+            <a:r>
+              <a:rPr lang="zh-CN" altLang="en-US" dirty="0" smtClean="0"/>
+              <a:t>基本</a:t>
+            </a:r>
             <a:r>
               <a:rPr lang="zh-CN" altLang="en-US" dirty="0"/>
-              <a:t>基本流程</a:t>
-            </a:r>
-          </a:p>
-        </p:txBody>
-      </p:sp>
-      <p:sp>
-        <p:nvSpPr>
-          <p:cNvPr id="5" name="内容占位符 4"/>
-          <p:cNvSpPr>
-            <a:spLocks noGrp="1"/>
-          </p:cNvSpPr>
+              <a:t>流程</a:t>
+            </a:r>
+          </a:p>
+        </p:txBody>
+      </p:sp>
+      <p:graphicFrame>
+        <p:nvGraphicFramePr>
+          <p:cNvPr id="7" name="内容占位符 6"/>
+          <p:cNvGraphicFramePr>
+            <a:graphicFrameLocks noGrp="1"/>
+          </p:cNvGraphicFramePr>
           <p:nvPr>
             <p:ph idx="1"/>
           </p:nvPr>
-        </p:nvSpPr>
-        <p:spPr>
-          <a:xfrm>
-            <a:off x="457200" y="1142984"/>
-            <a:ext cx="8229600" cy="4983179"/>
-          </a:xfrm>
-        </p:spPr>
-        <p:txBody>
-          <a:bodyPr>
-            <a:noAutofit/>
-          </a:bodyPr>
-          <a:lstStyle/>
-          <a:p>
-            <a:pPr lvl="0"/>
-            <a:r>
-              <a:rPr lang="zh-CN" altLang="en-US" sz="1400" dirty="0"/>
-              <a:t>订单录入</a:t>
-            </a:r>
-          </a:p>
-          <a:p>
-            <a:pPr lvl="0"/>
-            <a:r>
-              <a:rPr lang="zh-CN" altLang="en-US" sz="1400" dirty="0"/>
-              <a:t>订单核验</a:t>
-            </a:r>
-          </a:p>
-          <a:p>
-            <a:pPr lvl="0"/>
-            <a:r>
-              <a:rPr lang="zh-CN" altLang="en-US" sz="1400" dirty="0"/>
-              <a:t>原料需求</a:t>
-            </a:r>
-          </a:p>
-          <a:p>
-            <a:pPr lvl="0"/>
-            <a:r>
-              <a:rPr lang="zh-CN" altLang="en-US" sz="1400" dirty="0"/>
-              <a:t>原料订单</a:t>
-            </a:r>
-          </a:p>
-          <a:p>
-            <a:pPr lvl="0"/>
-            <a:r>
-              <a:rPr lang="zh-CN" altLang="en-US" sz="1400" dirty="0"/>
-              <a:t>原料入库出库</a:t>
-            </a:r>
-          </a:p>
-          <a:p>
-            <a:pPr lvl="0"/>
-            <a:r>
-              <a:rPr lang="zh-CN" altLang="en-US" sz="1400" dirty="0"/>
-              <a:t>生产任务计划</a:t>
-            </a:r>
-          </a:p>
-          <a:p>
-            <a:pPr lvl="0"/>
-            <a:r>
-              <a:rPr lang="zh-CN" altLang="en-US" sz="1400" dirty="0"/>
-              <a:t>制粉</a:t>
-            </a:r>
-          </a:p>
-          <a:p>
-            <a:pPr lvl="0"/>
-            <a:r>
-              <a:rPr lang="zh-CN" altLang="en-US" sz="1400" dirty="0"/>
-              <a:t>热压</a:t>
-            </a:r>
-          </a:p>
-          <a:p>
-            <a:pPr lvl="0"/>
-            <a:r>
-              <a:rPr lang="zh-CN" altLang="en-US" sz="1400" dirty="0"/>
-              <a:t>取模</a:t>
-            </a:r>
-          </a:p>
-          <a:p>
-            <a:pPr lvl="0"/>
-            <a:r>
-              <a:rPr lang="zh-CN" altLang="en-US" sz="1400" dirty="0"/>
-              <a:t>机加工</a:t>
-            </a:r>
-          </a:p>
-          <a:p>
-            <a:pPr lvl="0"/>
-            <a:r>
-              <a:rPr lang="zh-CN" altLang="en-US" sz="1400" dirty="0"/>
-              <a:t>检测</a:t>
-            </a:r>
-          </a:p>
-          <a:p>
-            <a:pPr lvl="0"/>
-            <a:r>
-              <a:rPr lang="zh-CN" altLang="en-US" sz="1400" dirty="0"/>
-              <a:t>绑定</a:t>
-            </a:r>
-            <a:endParaRPr lang="en-US" altLang="zh-CN" sz="1400" dirty="0"/>
-          </a:p>
-          <a:p>
-            <a:pPr lvl="0"/>
-            <a:r>
-              <a:rPr lang="zh-CN" altLang="en-US" sz="1400" dirty="0"/>
-              <a:t>产品入库</a:t>
-            </a:r>
-            <a:endParaRPr lang="en-US" altLang="zh-CN" sz="1400" dirty="0"/>
-          </a:p>
-          <a:p>
-            <a:pPr lvl="0"/>
-            <a:r>
-              <a:rPr lang="zh-CN" altLang="en-US" sz="1400" dirty="0"/>
-              <a:t>产品发货</a:t>
-            </a:r>
-          </a:p>
-          <a:p>
-            <a:endParaRPr lang="zh-CN" altLang="en-US" sz="1400" dirty="0"/>
-          </a:p>
-        </p:txBody>
-      </p:sp>
+        </p:nvGraphicFramePr>
+        <p:xfrm>
+          <a:off x="457200" y="1600200"/>
+          <a:ext cx="8229600" cy="3708400"/>
+        </p:xfrm>
+        <a:graphic>
+          <a:graphicData uri="http://schemas.openxmlformats.org/drawingml/2006/table">
+            <a:tbl>
+              <a:tblPr firstRow="1" bandRow="1">
+                <a:tableStyleId>{5C22544A-7EE6-4342-B048-85BDC9FD1C3A}</a:tableStyleId>
+              </a:tblPr>
+              <a:tblGrid>
+                <a:gridCol w="730424"/>
+                <a:gridCol w="720080"/>
+                <a:gridCol w="6779096"/>
+              </a:tblGrid>
+              <a:tr h="370840">
+                <a:tc>
+                  <a:txBody>
+                    <a:bodyPr/>
+                    <a:lstStyle/>
+                    <a:p>
+                      <a:r>
+                        <a:rPr lang="zh-CN" altLang="en-US" dirty="0" smtClean="0"/>
+                        <a:t>序号</a:t>
+                      </a:r>
+                      <a:endParaRPr lang="zh-CN" altLang="en-US" dirty="0"/>
+                    </a:p>
+                  </a:txBody>
+                  <a:tcPr/>
+                </a:tc>
+                <a:tc>
+                  <a:txBody>
+                    <a:bodyPr/>
+                    <a:lstStyle/>
+                    <a:p>
+                      <a:r>
+                        <a:rPr lang="zh-CN" altLang="en-US" dirty="0" smtClean="0"/>
+                        <a:t>流程</a:t>
+                      </a:r>
+                      <a:endParaRPr lang="zh-CN" altLang="en-US" dirty="0"/>
+                    </a:p>
+                  </a:txBody>
+                  <a:tcPr/>
+                </a:tc>
+                <a:tc>
+                  <a:txBody>
+                    <a:bodyPr/>
+                    <a:lstStyle/>
+                    <a:p>
+                      <a:r>
+                        <a:rPr lang="zh-CN" altLang="en-US" dirty="0" smtClean="0"/>
+                        <a:t>项目</a:t>
+                      </a:r>
+                      <a:endParaRPr lang="zh-CN" altLang="en-US" dirty="0"/>
+                    </a:p>
+                  </a:txBody>
+                  <a:tcPr/>
+                </a:tc>
+              </a:tr>
+              <a:tr h="370840">
+                <a:tc>
+                  <a:txBody>
+                    <a:bodyPr/>
+                    <a:lstStyle/>
+                    <a:p>
+                      <a:pPr algn="ctr"/>
+                      <a:r>
+                        <a:rPr lang="en-US" altLang="zh-CN" dirty="0" smtClean="0"/>
+                        <a:t>1</a:t>
+                      </a:r>
+                      <a:endParaRPr lang="zh-CN" altLang="en-US" dirty="0"/>
+                    </a:p>
+                  </a:txBody>
+                  <a:tcPr/>
+                </a:tc>
+                <a:tc>
+                  <a:txBody>
+                    <a:bodyPr/>
+                    <a:lstStyle/>
+                    <a:p>
+                      <a:r>
+                        <a:rPr lang="zh-CN" altLang="en-US" dirty="0" smtClean="0"/>
+                        <a:t>订单</a:t>
+                      </a:r>
+                      <a:endParaRPr lang="zh-CN" altLang="en-US" dirty="0"/>
+                    </a:p>
+                  </a:txBody>
+                  <a:tcPr/>
+                </a:tc>
+                <a:tc>
+                  <a:txBody>
+                    <a:bodyPr/>
+                    <a:lstStyle/>
+                    <a:p>
+                      <a:r>
+                        <a:rPr lang="zh-CN" altLang="en-US" dirty="0" smtClean="0"/>
+                        <a:t>订单录入</a:t>
+                      </a:r>
+                      <a:r>
+                        <a:rPr lang="en-US" altLang="zh-CN" dirty="0" smtClean="0"/>
+                        <a:t>-</a:t>
+                      </a:r>
+                      <a:r>
+                        <a:rPr lang="zh-CN" altLang="en-US" dirty="0" smtClean="0"/>
+                        <a:t>订单核验</a:t>
+                      </a:r>
+                      <a:r>
+                        <a:rPr lang="en-US" altLang="zh-CN" dirty="0" smtClean="0"/>
+                        <a:t>-</a:t>
+                      </a:r>
+                      <a:r>
+                        <a:rPr lang="zh-CN" altLang="en-US" dirty="0" smtClean="0"/>
+                        <a:t>客户管理</a:t>
+                      </a:r>
+                      <a:r>
+                        <a:rPr lang="en-US" altLang="zh-CN" dirty="0" smtClean="0"/>
+                        <a:t>-</a:t>
+                      </a:r>
+                      <a:r>
+                        <a:rPr lang="zh-CN" altLang="en-US" dirty="0" smtClean="0"/>
+                        <a:t>外购订单</a:t>
+                      </a:r>
+                      <a:endParaRPr lang="zh-CN" altLang="en-US" dirty="0"/>
+                    </a:p>
+                  </a:txBody>
+                  <a:tcPr/>
+                </a:tc>
+              </a:tr>
+              <a:tr h="370840">
+                <a:tc>
+                  <a:txBody>
+                    <a:bodyPr/>
+                    <a:lstStyle/>
+                    <a:p>
+                      <a:pPr algn="ctr"/>
+                      <a:r>
+                        <a:rPr lang="en-US" altLang="zh-CN" dirty="0" smtClean="0"/>
+                        <a:t>2</a:t>
+                      </a:r>
+                      <a:endParaRPr lang="zh-CN" altLang="en-US" dirty="0"/>
+                    </a:p>
+                  </a:txBody>
+                  <a:tcPr/>
+                </a:tc>
+                <a:tc>
+                  <a:txBody>
+                    <a:bodyPr/>
+                    <a:lstStyle/>
+                    <a:p>
+                      <a:r>
+                        <a:rPr lang="zh-CN" altLang="en-US" dirty="0" smtClean="0"/>
+                        <a:t>原料</a:t>
+                      </a:r>
+                      <a:endParaRPr lang="zh-CN" altLang="en-US" dirty="0"/>
+                    </a:p>
+                  </a:txBody>
+                  <a:tcPr/>
+                </a:tc>
+                <a:tc>
+                  <a:txBody>
+                    <a:bodyPr/>
+                    <a:lstStyle/>
+                    <a:p>
+                      <a:r>
+                        <a:rPr lang="zh-CN" altLang="en-US" dirty="0" smtClean="0"/>
+                        <a:t>原料需求</a:t>
+                      </a:r>
+                      <a:r>
+                        <a:rPr lang="en-US" altLang="zh-CN" dirty="0" smtClean="0"/>
+                        <a:t>-</a:t>
+                      </a:r>
+                      <a:r>
+                        <a:rPr lang="zh-CN" altLang="en-US" dirty="0" smtClean="0"/>
+                        <a:t>原料订单</a:t>
+                      </a:r>
+                      <a:r>
+                        <a:rPr lang="en-US" altLang="zh-CN" dirty="0" smtClean="0"/>
+                        <a:t>-</a:t>
+                      </a:r>
+                      <a:r>
+                        <a:rPr lang="zh-CN" altLang="en-US" dirty="0" smtClean="0"/>
+                        <a:t>原料库存</a:t>
+                      </a:r>
+                      <a:r>
+                        <a:rPr lang="en-US" altLang="zh-CN" dirty="0" smtClean="0"/>
+                        <a:t>-</a:t>
+                      </a:r>
+                      <a:r>
+                        <a:rPr lang="zh-CN" altLang="en-US" dirty="0" smtClean="0"/>
+                        <a:t>背板库存</a:t>
+                      </a:r>
+                      <a:endParaRPr lang="zh-CN" altLang="en-US" dirty="0"/>
+                    </a:p>
+                  </a:txBody>
+                  <a:tcPr/>
+                </a:tc>
+              </a:tr>
+              <a:tr h="370840">
+                <a:tc>
+                  <a:txBody>
+                    <a:bodyPr/>
+                    <a:lstStyle/>
+                    <a:p>
+                      <a:pPr algn="ctr"/>
+                      <a:r>
+                        <a:rPr lang="en-US" altLang="zh-CN" dirty="0" smtClean="0"/>
+                        <a:t>3</a:t>
+                      </a:r>
+                      <a:endParaRPr lang="zh-CN" altLang="en-US" dirty="0"/>
+                    </a:p>
+                  </a:txBody>
+                  <a:tcPr/>
+                </a:tc>
+                <a:tc>
+                  <a:txBody>
+                    <a:bodyPr/>
+                    <a:lstStyle/>
+                    <a:p>
+                      <a:r>
+                        <a:rPr lang="zh-CN" altLang="en-US" dirty="0" smtClean="0"/>
+                        <a:t>任务</a:t>
+                      </a:r>
+                      <a:endParaRPr lang="zh-CN" altLang="en-US" dirty="0"/>
+                    </a:p>
+                  </a:txBody>
+                  <a:tcPr/>
+                </a:tc>
+                <a:tc>
+                  <a:txBody>
+                    <a:bodyPr/>
+                    <a:lstStyle/>
+                    <a:p>
+                      <a:r>
+                        <a:rPr lang="zh-CN" altLang="en-US" dirty="0" smtClean="0"/>
+                        <a:t>生产任务</a:t>
+                      </a:r>
+                      <a:endParaRPr lang="zh-CN" altLang="en-US" dirty="0"/>
+                    </a:p>
+                  </a:txBody>
+                  <a:tcPr/>
+                </a:tc>
+              </a:tr>
+              <a:tr h="370840">
+                <a:tc>
+                  <a:txBody>
+                    <a:bodyPr/>
+                    <a:lstStyle/>
+                    <a:p>
+                      <a:pPr algn="ctr"/>
+                      <a:r>
+                        <a:rPr lang="en-US" altLang="zh-CN" dirty="0" smtClean="0"/>
+                        <a:t>4</a:t>
+                      </a:r>
+                      <a:endParaRPr lang="zh-CN" altLang="en-US" dirty="0"/>
+                    </a:p>
+                  </a:txBody>
+                  <a:tcPr/>
+                </a:tc>
+                <a:tc>
+                  <a:txBody>
+                    <a:bodyPr/>
+                    <a:lstStyle/>
+                    <a:p>
+                      <a:r>
+                        <a:rPr lang="zh-CN" altLang="en-US" dirty="0" smtClean="0"/>
+                        <a:t>计划</a:t>
+                      </a:r>
+                      <a:endParaRPr lang="zh-CN" altLang="en-US" dirty="0"/>
+                    </a:p>
+                  </a:txBody>
+                  <a:tcPr/>
+                </a:tc>
+                <a:tc>
+                  <a:txBody>
+                    <a:bodyPr/>
+                    <a:lstStyle/>
+                    <a:p>
+                      <a:r>
+                        <a:rPr lang="zh-CN" altLang="en-US" dirty="0" smtClean="0"/>
+                        <a:t>生产计划</a:t>
+                      </a:r>
+                      <a:endParaRPr lang="zh-CN" altLang="en-US" dirty="0"/>
+                    </a:p>
+                  </a:txBody>
+                  <a:tcPr/>
+                </a:tc>
+              </a:tr>
+              <a:tr h="370840">
+                <a:tc>
+                  <a:txBody>
+                    <a:bodyPr/>
+                    <a:lstStyle/>
+                    <a:p>
+                      <a:pPr algn="ctr"/>
+                      <a:r>
+                        <a:rPr lang="en-US" altLang="zh-CN" dirty="0" smtClean="0"/>
+                        <a:t>5</a:t>
+                      </a:r>
+                      <a:endParaRPr lang="zh-CN" altLang="en-US" dirty="0"/>
+                    </a:p>
+                  </a:txBody>
+                  <a:tcPr/>
+                </a:tc>
+                <a:tc>
+                  <a:txBody>
+                    <a:bodyPr/>
+                    <a:lstStyle/>
+                    <a:p>
+                      <a:r>
+                        <a:rPr lang="zh-CN" altLang="en-US" dirty="0" smtClean="0"/>
+                        <a:t>记录</a:t>
+                      </a:r>
+                      <a:endParaRPr lang="zh-CN" altLang="en-US" dirty="0"/>
+                    </a:p>
+                  </a:txBody>
+                  <a:tcPr/>
+                </a:tc>
+                <a:tc>
+                  <a:txBody>
+                    <a:bodyPr/>
+                    <a:lstStyle/>
+                    <a:p>
+                      <a:r>
+                        <a:rPr lang="zh-CN" altLang="en-US" dirty="0" smtClean="0"/>
+                        <a:t>制粉记录</a:t>
+                      </a:r>
+                      <a:r>
+                        <a:rPr lang="en-US" altLang="zh-CN" dirty="0" smtClean="0"/>
+                        <a:t>-</a:t>
+                      </a:r>
+                      <a:r>
+                        <a:rPr lang="zh-CN" altLang="en-US" dirty="0" smtClean="0"/>
+                        <a:t>热压记录</a:t>
+                      </a:r>
+                      <a:r>
+                        <a:rPr lang="en-US" altLang="zh-CN" dirty="0" smtClean="0"/>
+                        <a:t>-</a:t>
+                      </a:r>
+                      <a:r>
+                        <a:rPr lang="zh-CN" altLang="en-US" dirty="0" smtClean="0"/>
+                        <a:t>取模记录</a:t>
+                      </a:r>
+                      <a:r>
+                        <a:rPr lang="en-US" altLang="zh-CN" dirty="0" smtClean="0"/>
+                        <a:t>-</a:t>
+                      </a:r>
+                      <a:r>
+                        <a:rPr lang="zh-CN" altLang="en-US" dirty="0" smtClean="0"/>
+                        <a:t>加工记录</a:t>
+                      </a:r>
+                      <a:r>
+                        <a:rPr lang="en-US" altLang="zh-CN" dirty="0" smtClean="0"/>
+                        <a:t>-</a:t>
+                      </a:r>
+                      <a:r>
+                        <a:rPr lang="zh-CN" altLang="en-US" dirty="0" smtClean="0"/>
+                        <a:t>检测记录</a:t>
+                      </a:r>
+                      <a:r>
+                        <a:rPr lang="en-US" altLang="zh-CN" dirty="0" smtClean="0"/>
+                        <a:t>-</a:t>
+                      </a:r>
+                      <a:r>
+                        <a:rPr lang="zh-CN" altLang="en-US" dirty="0" smtClean="0"/>
+                        <a:t>绑定记录</a:t>
+                      </a:r>
+                      <a:endParaRPr lang="zh-CN" altLang="en-US" dirty="0"/>
+                    </a:p>
+                  </a:txBody>
+                  <a:tcPr/>
+                </a:tc>
+              </a:tr>
+              <a:tr h="370840">
+                <a:tc>
+                  <a:txBody>
+                    <a:bodyPr/>
+                    <a:lstStyle/>
+                    <a:p>
+                      <a:pPr algn="ctr"/>
+                      <a:r>
+                        <a:rPr lang="en-US" altLang="zh-CN" dirty="0" smtClean="0"/>
+                        <a:t>6</a:t>
+                      </a:r>
+                      <a:endParaRPr lang="zh-CN" altLang="en-US" dirty="0"/>
+                    </a:p>
+                  </a:txBody>
+                  <a:tcPr/>
+                </a:tc>
+                <a:tc>
+                  <a:txBody>
+                    <a:bodyPr/>
+                    <a:lstStyle/>
+                    <a:p>
+                      <a:r>
+                        <a:rPr lang="zh-CN" altLang="en-US" dirty="0" smtClean="0"/>
+                        <a:t>库存</a:t>
+                      </a:r>
+                      <a:endParaRPr lang="zh-CN" altLang="en-US" dirty="0"/>
+                    </a:p>
+                  </a:txBody>
+                  <a:tcPr/>
+                </a:tc>
+                <a:tc>
+                  <a:txBody>
+                    <a:bodyPr/>
+                    <a:lstStyle/>
+                    <a:p>
+                      <a:r>
+                        <a:rPr lang="zh-CN" altLang="en-US" dirty="0" smtClean="0"/>
+                        <a:t>成品库存</a:t>
+                      </a:r>
+                      <a:endParaRPr lang="zh-CN" altLang="en-US" dirty="0"/>
+                    </a:p>
+                  </a:txBody>
+                  <a:tcPr/>
+                </a:tc>
+              </a:tr>
+              <a:tr h="370840">
+                <a:tc>
+                  <a:txBody>
+                    <a:bodyPr/>
+                    <a:lstStyle/>
+                    <a:p>
+                      <a:pPr algn="ctr"/>
+                      <a:r>
+                        <a:rPr lang="en-US" altLang="zh-CN" dirty="0" smtClean="0"/>
+                        <a:t>7</a:t>
+                      </a:r>
+                      <a:endParaRPr lang="zh-CN" altLang="en-US" dirty="0"/>
+                    </a:p>
+                  </a:txBody>
+                  <a:tcPr/>
+                </a:tc>
+                <a:tc>
+                  <a:txBody>
+                    <a:bodyPr/>
+                    <a:lstStyle/>
+                    <a:p>
+                      <a:r>
+                        <a:rPr lang="zh-CN" altLang="en-US" dirty="0" smtClean="0"/>
+                        <a:t>发货</a:t>
+                      </a:r>
+                      <a:endParaRPr lang="zh-CN" altLang="en-US" dirty="0"/>
+                    </a:p>
+                  </a:txBody>
+                  <a:tcPr/>
+                </a:tc>
+                <a:tc>
+                  <a:txBody>
+                    <a:bodyPr/>
+                    <a:lstStyle/>
+                    <a:p>
+                      <a:r>
+                        <a:rPr lang="zh-CN" altLang="en-US" dirty="0" smtClean="0"/>
+                        <a:t>发货管理</a:t>
+                      </a:r>
+                      <a:endParaRPr lang="zh-CN" altLang="en-US" dirty="0"/>
+                    </a:p>
+                  </a:txBody>
+                  <a:tcPr/>
+                </a:tc>
+              </a:tr>
+              <a:tr h="370840">
+                <a:tc>
+                  <a:txBody>
+                    <a:bodyPr/>
+                    <a:lstStyle/>
+                    <a:p>
+                      <a:pPr algn="ctr"/>
+                      <a:r>
+                        <a:rPr lang="en-US" altLang="zh-CN" dirty="0" smtClean="0"/>
+                        <a:t>8</a:t>
+                      </a:r>
+                      <a:endParaRPr lang="zh-CN" altLang="en-US" dirty="0"/>
+                    </a:p>
+                  </a:txBody>
+                  <a:tcPr/>
+                </a:tc>
+                <a:tc>
+                  <a:txBody>
+                    <a:bodyPr/>
+                    <a:lstStyle/>
+                    <a:p>
+                      <a:r>
+                        <a:rPr lang="zh-CN" altLang="en-US" dirty="0" smtClean="0"/>
+                        <a:t>售后</a:t>
+                      </a:r>
+                      <a:endParaRPr lang="zh-CN" altLang="en-US" dirty="0"/>
+                    </a:p>
+                  </a:txBody>
+                  <a:tcPr/>
+                </a:tc>
+                <a:tc>
+                  <a:txBody>
+                    <a:bodyPr/>
+                    <a:lstStyle/>
+                    <a:p>
+                      <a:r>
+                        <a:rPr lang="zh-CN" altLang="en-US" dirty="0" smtClean="0"/>
+                        <a:t>客户反馈</a:t>
+                      </a:r>
+                      <a:endParaRPr lang="zh-CN" altLang="en-US" dirty="0"/>
+                    </a:p>
+                  </a:txBody>
+                  <a:tcPr/>
+                </a:tc>
+              </a:tr>
+              <a:tr h="370840">
+                <a:tc>
+                  <a:txBody>
+                    <a:bodyPr/>
+                    <a:lstStyle/>
+                    <a:p>
+                      <a:endParaRPr lang="zh-CN" altLang="en-US"/>
+                    </a:p>
+                  </a:txBody>
+                  <a:tcPr/>
+                </a:tc>
+                <a:tc>
+                  <a:txBody>
+                    <a:bodyPr/>
+                    <a:lstStyle/>
+                    <a:p>
+                      <a:endParaRPr lang="zh-CN" altLang="en-US"/>
+                    </a:p>
+                  </a:txBody>
+                  <a:tcPr/>
+                </a:tc>
+                <a:tc>
+                  <a:txBody>
+                    <a:bodyPr/>
+                    <a:lstStyle/>
+                    <a:p>
+                      <a:endParaRPr lang="zh-CN" altLang="en-US"/>
+                    </a:p>
+                  </a:txBody>
+                  <a:tcPr/>
+                </a:tc>
+              </a:tr>
+            </a:tbl>
+          </a:graphicData>
+        </a:graphic>
+      </p:graphicFrame>
     </p:spTree>
   </p:cSld>
   <p:clrMapOvr>
@@ -3821,6 +4441,7 @@
           <a:bodyPr/>
           <a:lstStyle/>
           <a:p>
+            <a:pPr algn="l"/>
             <a:r>
               <a:rPr lang="zh-CN" altLang="en-US" dirty="0"/>
               <a:t>基本功能</a:t>
@@ -3865,8 +4486,15 @@
           </a:p>
           <a:p>
             <a:r>
+              <a:rPr lang="zh-CN" altLang="en-US" dirty="0" smtClean="0"/>
+              <a:t>统计</a:t>
+            </a:r>
+            <a:endParaRPr lang="en-US" altLang="zh-CN" dirty="0" smtClean="0"/>
+          </a:p>
+          <a:p>
+            <a:r>
               <a:rPr lang="zh-CN" altLang="en-US" dirty="0"/>
-              <a:t>统计</a:t>
+              <a:t>通知</a:t>
             </a:r>
             <a:endParaRPr lang="en-US" altLang="zh-CN" dirty="0"/>
           </a:p>
@@ -3912,6 +4540,7 @@
           <a:bodyPr/>
           <a:lstStyle/>
           <a:p>
+            <a:pPr algn="l"/>
             <a:r>
               <a:rPr lang="zh-CN" altLang="en-US" dirty="0"/>
               <a:t>信息流</a:t>
@@ -3935,52 +4564,52 @@
           <a:lstStyle/>
           <a:p>
             <a:r>
+              <a:rPr lang="en-US" altLang="zh-CN" dirty="0" smtClean="0"/>
+              <a:t>A=</a:t>
+            </a:r>
+            <a:r>
+              <a:rPr lang="zh-CN" altLang="en-US" dirty="0" smtClean="0"/>
+              <a:t>原始</a:t>
+            </a:r>
+            <a:r>
               <a:rPr lang="zh-CN" altLang="en-US" dirty="0"/>
-              <a:t>原始信息</a:t>
+              <a:t>信息</a:t>
             </a:r>
             <a:endParaRPr lang="en-US" altLang="zh-CN" dirty="0"/>
           </a:p>
           <a:p>
             <a:r>
-              <a:rPr lang="zh-CN" altLang="en-US" dirty="0"/>
-              <a:t>上一级信息</a:t>
-            </a:r>
-            <a:r>
               <a:rPr lang="en-US" altLang="zh-CN" dirty="0" smtClean="0"/>
-              <a:t>+</a:t>
-            </a:r>
-            <a:r>
-              <a:rPr lang="zh-CN" altLang="en-US" dirty="0" smtClean="0"/>
-              <a:t>本级新</a:t>
-            </a:r>
-            <a:r>
-              <a:rPr lang="zh-CN" altLang="en-US" dirty="0"/>
-              <a:t>添加的信息</a:t>
+              <a:t>B=A+</a:t>
+            </a:r>
+            <a:r>
+              <a:rPr lang="zh-CN" altLang="en-US" dirty="0" smtClean="0"/>
+              <a:t>新信息</a:t>
             </a:r>
             <a:endParaRPr lang="en-US" altLang="zh-CN" dirty="0"/>
           </a:p>
           <a:p>
             <a:r>
-              <a:rPr lang="zh-CN" altLang="en-US" dirty="0"/>
-              <a:t>流向下一级</a:t>
-            </a:r>
-            <a:endParaRPr lang="en-US" altLang="zh-CN" dirty="0"/>
-          </a:p>
-          <a:p>
-            <a:r>
-              <a:rPr lang="zh-CN" altLang="en-US" dirty="0"/>
-              <a:t>下一级再</a:t>
-            </a:r>
-            <a:r>
-              <a:rPr lang="zh-CN" altLang="en-US" dirty="0" smtClean="0"/>
-              <a:t>添加新的信息后流向下下一级</a:t>
+              <a:rPr lang="en-US" altLang="zh-CN" dirty="0" smtClean="0"/>
+              <a:t>C=B+</a:t>
+            </a:r>
+            <a:r>
+              <a:rPr lang="zh-CN" altLang="en-US" dirty="0" smtClean="0"/>
+              <a:t>新信息</a:t>
             </a:r>
             <a:endParaRPr lang="en-US" altLang="zh-CN" dirty="0" smtClean="0"/>
           </a:p>
           <a:p>
             <a:r>
               <a:rPr lang="zh-CN" altLang="en-US" dirty="0" smtClean="0"/>
-              <a:t>类推。</a:t>
+              <a:t>一直下去</a:t>
+            </a:r>
+            <a:endParaRPr lang="en-US" altLang="zh-CN" dirty="0" smtClean="0"/>
+          </a:p>
+          <a:p>
+            <a:r>
+              <a:rPr lang="zh-CN" altLang="en-US" dirty="0" smtClean="0"/>
+              <a:t>每个步骤在上一步骤信息的基础上添加新信息然后传递给下一个步骤</a:t>
             </a:r>
             <a:endParaRPr lang="en-US" altLang="zh-CN" dirty="0"/>
           </a:p>
@@ -3989,7 +4618,7 @@
     </p:spTree>
     <p:extLst>
       <p:ext uri="{BB962C8B-B14F-4D97-AF65-F5344CB8AC3E}">
-        <p14:creationId xmlns="" xmlns:p14="http://schemas.microsoft.com/office/powerpoint/2010/main" val="3335386666"/>
+        <p14:creationId xmlns:p14="http://schemas.microsoft.com/office/powerpoint/2010/main" xmlns="" val="3335386666"/>
       </p:ext>
     </p:extLst>
   </p:cSld>
@@ -4031,13 +4660,14 @@
           <a:bodyPr/>
           <a:lstStyle/>
           <a:p>
+            <a:pPr algn="l"/>
             <a:r>
               <a:rPr lang="zh-CN" altLang="en-US" dirty="0"/>
               <a:t>基本</a:t>
             </a:r>
             <a:r>
               <a:rPr lang="zh-CN" altLang="en-US" dirty="0" smtClean="0"/>
-              <a:t>模块设计</a:t>
+              <a:t>模块</a:t>
             </a:r>
             <a:endParaRPr lang="zh-CN" altLang="en-US" dirty="0"/>
           </a:p>
@@ -4164,9 +4794,10 @@
           <a:bodyPr/>
           <a:lstStyle/>
           <a:p>
-            <a:r>
-              <a:rPr lang="zh-CN" altLang="en-US" dirty="0" smtClean="0"/>
-              <a:t>权限控制设计</a:t>
+            <a:pPr algn="l"/>
+            <a:r>
+              <a:rPr lang="zh-CN" altLang="en-US" dirty="0" smtClean="0"/>
+              <a:t>基本编号</a:t>
             </a:r>
             <a:endParaRPr lang="zh-CN" altLang="en-US" dirty="0"/>
           </a:p>
@@ -4189,22 +4820,47 @@
           <a:p>
             <a:r>
               <a:rPr lang="zh-CN" altLang="en-US" dirty="0" smtClean="0"/>
-              <a:t>每个人都有自己的账号</a:t>
+              <a:t>类似股票代码，提供唯一的，能够快捷确认信息记录的编号</a:t>
             </a:r>
             <a:endParaRPr lang="en-US" altLang="zh-CN" dirty="0" smtClean="0"/>
           </a:p>
           <a:p>
             <a:r>
               <a:rPr lang="zh-CN" altLang="en-US" dirty="0" smtClean="0"/>
-              <a:t>权限分配针对角色</a:t>
+              <a:t>订单对应内部工作号</a:t>
+            </a:r>
+            <a:r>
+              <a:rPr lang="en-US" altLang="zh-CN" dirty="0" err="1" smtClean="0"/>
+              <a:t>PMINumber</a:t>
+            </a:r>
+            <a:endParaRPr lang="en-US" altLang="zh-CN" dirty="0" smtClean="0"/>
+          </a:p>
+          <a:p>
+            <a:r>
+              <a:rPr lang="zh-CN" altLang="en-US" dirty="0" smtClean="0"/>
+              <a:t>原料订单对应原料订单编号</a:t>
             </a:r>
             <a:r>
               <a:rPr lang="en-US" altLang="zh-CN" dirty="0" smtClean="0"/>
-              <a:t>Role</a:t>
-            </a:r>
-            <a:r>
-              <a:rPr lang="zh-CN" altLang="en-US" dirty="0" smtClean="0"/>
-              <a:t>进行，然后每个人分配角色，同样的角色拥有同样的权限。</a:t>
+              <a:t>+</a:t>
+            </a:r>
+            <a:r>
+              <a:rPr lang="zh-CN" altLang="en-US" dirty="0" smtClean="0"/>
+              <a:t>原料订单项编号</a:t>
+            </a:r>
+            <a:endParaRPr lang="en-US" altLang="zh-CN" dirty="0" smtClean="0"/>
+          </a:p>
+          <a:p>
+            <a:r>
+              <a:rPr lang="zh-CN" altLang="en-US" dirty="0" smtClean="0"/>
+              <a:t>热压对应热压编号</a:t>
+            </a:r>
+            <a:endParaRPr lang="en-US" altLang="zh-CN" dirty="0" smtClean="0"/>
+          </a:p>
+          <a:p>
+            <a:r>
+              <a:rPr lang="zh-CN" altLang="en-US" dirty="0" smtClean="0"/>
+              <a:t>背板对应背板编号</a:t>
             </a:r>
             <a:endParaRPr lang="zh-CN" altLang="en-US" dirty="0"/>
           </a:p>
@@ -4250,9 +4906,10 @@
           <a:bodyPr/>
           <a:lstStyle/>
           <a:p>
-            <a:r>
-              <a:rPr lang="zh-CN" altLang="en-US" dirty="0" smtClean="0"/>
-              <a:t>快照系统设计</a:t>
+            <a:pPr algn="l"/>
+            <a:r>
+              <a:rPr lang="zh-CN" altLang="en-US" dirty="0" smtClean="0"/>
+              <a:t>作废设计</a:t>
             </a:r>
             <a:endParaRPr lang="zh-CN" altLang="en-US" dirty="0"/>
           </a:p>
@@ -4275,21 +4932,44 @@
           <a:p>
             <a:r>
               <a:rPr lang="zh-CN" altLang="en-US" dirty="0" smtClean="0"/>
-              <a:t>所有更改操作都会在更改之前触发一个快照动作，将更改前的当前数据“冻结”后存入快照记录，更改一次，冻结存储一次，这个过程是服务器自动进行的，人不参与。</a:t>
+              <a:t>本</a:t>
+            </a:r>
+            <a:r>
+              <a:rPr lang="zh-CN" altLang="en-US" dirty="0" smtClean="0"/>
+              <a:t>系统没有</a:t>
+            </a:r>
+            <a:r>
+              <a:rPr lang="zh-CN" altLang="en-US" dirty="0" smtClean="0"/>
+              <a:t>使用真正的</a:t>
+            </a:r>
+            <a:r>
+              <a:rPr lang="zh-CN" altLang="en-US" dirty="0" smtClean="0"/>
+              <a:t>删除，</a:t>
+            </a:r>
+            <a:r>
+              <a:rPr lang="zh-CN" altLang="en-US" dirty="0" smtClean="0"/>
+              <a:t>而是采用类似回收站的方式虚拟删除，防止数据误删时间发生。</a:t>
             </a:r>
             <a:endParaRPr lang="en-US" altLang="zh-CN" dirty="0" smtClean="0"/>
           </a:p>
           <a:p>
             <a:r>
               <a:rPr lang="zh-CN" altLang="en-US" dirty="0" smtClean="0"/>
-              <a:t>目的防止无意更改，应对恶意更改；</a:t>
+              <a:t>所有数据一经录入，会一直存在服务器中。</a:t>
             </a:r>
             <a:endParaRPr lang="en-US" altLang="zh-CN" dirty="0" smtClean="0"/>
           </a:p>
           <a:p>
             <a:r>
               <a:rPr lang="zh-CN" altLang="en-US" dirty="0" smtClean="0"/>
-              <a:t>提供接口可以访问只读的快照记录。</a:t>
+              <a:t>数据只能标记为作废，标记后，数据将不再被发送到客户端</a:t>
+            </a:r>
+            <a:endParaRPr lang="en-US" altLang="zh-CN" dirty="0" smtClean="0"/>
+          </a:p>
+          <a:p>
+            <a:r>
+              <a:rPr lang="zh-CN" altLang="en-US" dirty="0" smtClean="0"/>
+              <a:t>作废的数据，只有管理员可以访问到。</a:t>
             </a:r>
             <a:endParaRPr lang="en-US" altLang="zh-CN" dirty="0" smtClean="0"/>
           </a:p>

</xml_diff>